<commit_message>
feat: updates for full scale run
</commit_message>
<xml_diff>
--- a/materials/FlowDiagram.pptx
+++ b/materials/FlowDiagram.pptx
@@ -6,6 +6,7 @@
   </p:sldMasterIdLst>
   <p:sldIdLst>
     <p:sldId id="256" r:id="rId2"/>
+    <p:sldId id="257" r:id="rId3"/>
   </p:sldIdLst>
   <p:sldSz cx="12192000" cy="6858000"/>
   <p:notesSz cx="6858000" cy="9144000"/>
@@ -4675,6 +4676,314 @@
 </p:sld>
 </file>
 
+<file path=ppt/slides/slide2.xml><?xml version="1.0" encoding="utf-8"?>
+<p:sld xmlns:a="http://schemas.openxmlformats.org/drawingml/2006/main" xmlns:r="http://schemas.openxmlformats.org/officeDocument/2006/relationships" xmlns:p="http://schemas.openxmlformats.org/presentationml/2006/main">
+  <p:cSld>
+    <p:spTree>
+      <p:nvGrpSpPr>
+        <p:cNvPr id="1" name=""/>
+        <p:cNvGrpSpPr/>
+        <p:nvPr/>
+      </p:nvGrpSpPr>
+      <p:grpSpPr>
+        <a:xfrm>
+          <a:off x="0" y="0"/>
+          <a:ext cx="0" cy="0"/>
+          <a:chOff x="0" y="0"/>
+          <a:chExt cx="0" cy="0"/>
+        </a:xfrm>
+      </p:grpSpPr>
+      <p:cxnSp>
+        <p:nvCxnSpPr>
+          <p:cNvPr id="10" name="Straight Arrow Connector 9">
+            <a:extLst>
+              <a:ext uri="{FF2B5EF4-FFF2-40B4-BE49-F238E27FC236}">
+                <a16:creationId xmlns:a16="http://schemas.microsoft.com/office/drawing/2014/main" id="{D97E33AF-767B-7B42-9AE7-9356458DD02E}"/>
+              </a:ext>
+            </a:extLst>
+          </p:cNvPr>
+          <p:cNvCxnSpPr>
+            <a:cxnSpLocks/>
+          </p:cNvCxnSpPr>
+          <p:nvPr/>
+        </p:nvCxnSpPr>
+        <p:spPr>
+          <a:xfrm>
+            <a:off x="2458995" y="3113903"/>
+            <a:ext cx="2269523" cy="0"/>
+          </a:xfrm>
+          <a:prstGeom prst="straightConnector1">
+            <a:avLst/>
+          </a:prstGeom>
+          <a:ln>
+            <a:solidFill>
+              <a:schemeClr val="tx1"/>
+            </a:solidFill>
+            <a:tailEnd type="triangle"/>
+          </a:ln>
+        </p:spPr>
+        <p:style>
+          <a:lnRef idx="1">
+            <a:schemeClr val="accent1"/>
+          </a:lnRef>
+          <a:fillRef idx="0">
+            <a:schemeClr val="accent1"/>
+          </a:fillRef>
+          <a:effectRef idx="0">
+            <a:schemeClr val="accent1"/>
+          </a:effectRef>
+          <a:fontRef idx="minor">
+            <a:schemeClr val="tx1"/>
+          </a:fontRef>
+        </p:style>
+      </p:cxnSp>
+      <p:sp>
+        <p:nvSpPr>
+          <p:cNvPr id="4" name="Rounded Rectangle 3">
+            <a:extLst>
+              <a:ext uri="{FF2B5EF4-FFF2-40B4-BE49-F238E27FC236}">
+                <a16:creationId xmlns:a16="http://schemas.microsoft.com/office/drawing/2014/main" id="{9E6D85CA-D108-7C44-82B5-1DF84FC1438E}"/>
+              </a:ext>
+            </a:extLst>
+          </p:cNvPr>
+          <p:cNvSpPr/>
+          <p:nvPr/>
+        </p:nvSpPr>
+        <p:spPr>
+          <a:xfrm>
+            <a:off x="3039762" y="2496065"/>
+            <a:ext cx="605481" cy="1235676"/>
+          </a:xfrm>
+          <a:prstGeom prst="roundRect">
+            <a:avLst/>
+          </a:prstGeom>
+          <a:solidFill>
+            <a:srgbClr val="EBAA66"/>
+          </a:solidFill>
+          <a:ln>
+            <a:noFill/>
+          </a:ln>
+        </p:spPr>
+        <p:style>
+          <a:lnRef idx="2">
+            <a:schemeClr val="accent1">
+              <a:shade val="50000"/>
+            </a:schemeClr>
+          </a:lnRef>
+          <a:fillRef idx="1">
+            <a:schemeClr val="accent1"/>
+          </a:fillRef>
+          <a:effectRef idx="0">
+            <a:schemeClr val="accent1"/>
+          </a:effectRef>
+          <a:fontRef idx="minor">
+            <a:schemeClr val="lt1"/>
+          </a:fontRef>
+        </p:style>
+        <p:txBody>
+          <a:bodyPr rtlCol="0" anchor="ctr"/>
+          <a:lstStyle/>
+          <a:p>
+            <a:pPr algn="ctr"/>
+            <a:endParaRPr lang="en-US"/>
+          </a:p>
+        </p:txBody>
+      </p:sp>
+      <p:sp>
+        <p:nvSpPr>
+          <p:cNvPr id="5" name="Rounded Rectangle 4">
+            <a:extLst>
+              <a:ext uri="{FF2B5EF4-FFF2-40B4-BE49-F238E27FC236}">
+                <a16:creationId xmlns:a16="http://schemas.microsoft.com/office/drawing/2014/main" id="{D4BBB7D7-FEB5-3D4B-A3B4-75C92975DEF6}"/>
+              </a:ext>
+            </a:extLst>
+          </p:cNvPr>
+          <p:cNvSpPr/>
+          <p:nvPr/>
+        </p:nvSpPr>
+        <p:spPr>
+          <a:xfrm>
+            <a:off x="3884140" y="2496065"/>
+            <a:ext cx="605481" cy="1235676"/>
+          </a:xfrm>
+          <a:prstGeom prst="roundRect">
+            <a:avLst/>
+          </a:prstGeom>
+          <a:solidFill>
+            <a:srgbClr val="B07090"/>
+          </a:solidFill>
+          <a:ln>
+            <a:noFill/>
+          </a:ln>
+        </p:spPr>
+        <p:style>
+          <a:lnRef idx="2">
+            <a:schemeClr val="accent1">
+              <a:shade val="50000"/>
+            </a:schemeClr>
+          </a:lnRef>
+          <a:fillRef idx="1">
+            <a:schemeClr val="accent1"/>
+          </a:fillRef>
+          <a:effectRef idx="0">
+            <a:schemeClr val="accent1"/>
+          </a:effectRef>
+          <a:fontRef idx="minor">
+            <a:schemeClr val="lt1"/>
+          </a:fontRef>
+        </p:style>
+        <p:txBody>
+          <a:bodyPr rtlCol="0" anchor="ctr"/>
+          <a:lstStyle/>
+          <a:p>
+            <a:pPr algn="ctr"/>
+            <a:endParaRPr lang="en-US"/>
+          </a:p>
+        </p:txBody>
+      </p:sp>
+      <p:sp>
+        <p:nvSpPr>
+          <p:cNvPr id="6" name="Rounded Rectangle 5">
+            <a:extLst>
+              <a:ext uri="{FF2B5EF4-FFF2-40B4-BE49-F238E27FC236}">
+                <a16:creationId xmlns:a16="http://schemas.microsoft.com/office/drawing/2014/main" id="{5DD14CEB-051D-584B-BF3B-6FDA399C5F30}"/>
+              </a:ext>
+            </a:extLst>
+          </p:cNvPr>
+          <p:cNvSpPr/>
+          <p:nvPr/>
+        </p:nvSpPr>
+        <p:spPr>
+          <a:xfrm>
+            <a:off x="4728518" y="2496065"/>
+            <a:ext cx="605481" cy="1235676"/>
+          </a:xfrm>
+          <a:prstGeom prst="roundRect">
+            <a:avLst/>
+          </a:prstGeom>
+          <a:solidFill>
+            <a:srgbClr val="9800FC"/>
+          </a:solidFill>
+          <a:ln>
+            <a:noFill/>
+          </a:ln>
+        </p:spPr>
+        <p:style>
+          <a:lnRef idx="2">
+            <a:schemeClr val="accent1">
+              <a:shade val="50000"/>
+            </a:schemeClr>
+          </a:lnRef>
+          <a:fillRef idx="1">
+            <a:schemeClr val="accent1"/>
+          </a:fillRef>
+          <a:effectRef idx="0">
+            <a:schemeClr val="accent1"/>
+          </a:effectRef>
+          <a:fontRef idx="minor">
+            <a:schemeClr val="lt1"/>
+          </a:fontRef>
+        </p:style>
+        <p:txBody>
+          <a:bodyPr rtlCol="0" anchor="ctr"/>
+          <a:lstStyle/>
+          <a:p>
+            <a:pPr algn="ctr"/>
+            <a:endParaRPr lang="en-US"/>
+          </a:p>
+        </p:txBody>
+      </p:sp>
+      <p:sp>
+        <p:nvSpPr>
+          <p:cNvPr id="12" name="TextBox 11">
+            <a:extLst>
+              <a:ext uri="{FF2B5EF4-FFF2-40B4-BE49-F238E27FC236}">
+                <a16:creationId xmlns:a16="http://schemas.microsoft.com/office/drawing/2014/main" id="{63DB7C3B-4FA9-4D47-AC08-BFE11916A07A}"/>
+              </a:ext>
+            </a:extLst>
+          </p:cNvPr>
+          <p:cNvSpPr txBox="1"/>
+          <p:nvPr/>
+        </p:nvSpPr>
+        <p:spPr>
+          <a:xfrm>
+            <a:off x="640869" y="2929237"/>
+            <a:ext cx="1818126" cy="369332"/>
+          </a:xfrm>
+          <a:prstGeom prst="rect">
+            <a:avLst/>
+          </a:prstGeom>
+          <a:noFill/>
+        </p:spPr>
+        <p:txBody>
+          <a:bodyPr wrap="none" rtlCol="0">
+            <a:spAutoFit/>
+          </a:bodyPr>
+          <a:lstStyle/>
+          <a:p>
+            <a:r>
+              <a:rPr lang="en-US" b="1" dirty="0"/>
+              <a:t>Input</a:t>
+            </a:r>
+            <a:r>
+              <a:rPr lang="en-US" dirty="0"/>
+              <a:t>: 100x221x6</a:t>
+            </a:r>
+          </a:p>
+        </p:txBody>
+      </p:sp>
+      <p:sp>
+        <p:nvSpPr>
+          <p:cNvPr id="13" name="TextBox 12">
+            <a:extLst>
+              <a:ext uri="{FF2B5EF4-FFF2-40B4-BE49-F238E27FC236}">
+                <a16:creationId xmlns:a16="http://schemas.microsoft.com/office/drawing/2014/main" id="{4EB30F4F-2DD3-4F49-A8D5-B74A66FD47D1}"/>
+              </a:ext>
+            </a:extLst>
+          </p:cNvPr>
+          <p:cNvSpPr txBox="1"/>
+          <p:nvPr/>
+        </p:nvSpPr>
+        <p:spPr>
+          <a:xfrm>
+            <a:off x="5572896" y="2929237"/>
+            <a:ext cx="1319592" cy="369332"/>
+          </a:xfrm>
+          <a:prstGeom prst="rect">
+            <a:avLst/>
+          </a:prstGeom>
+          <a:noFill/>
+        </p:spPr>
+        <p:txBody>
+          <a:bodyPr wrap="none" rtlCol="0">
+            <a:spAutoFit/>
+          </a:bodyPr>
+          <a:lstStyle/>
+          <a:p>
+            <a:r>
+              <a:rPr lang="en-US" b="1" dirty="0"/>
+              <a:t>Output</a:t>
+            </a:r>
+            <a:r>
+              <a:rPr lang="en-US" dirty="0"/>
+              <a:t>: 1x3</a:t>
+            </a:r>
+          </a:p>
+        </p:txBody>
+      </p:sp>
+    </p:spTree>
+    <p:extLst>
+      <p:ext uri="{BB962C8B-B14F-4D97-AF65-F5344CB8AC3E}">
+        <p14:creationId xmlns:p14="http://schemas.microsoft.com/office/powerpoint/2010/main" val="2921866611"/>
+      </p:ext>
+    </p:extLst>
+  </p:cSld>
+  <p:clrMapOvr>
+    <a:masterClrMapping/>
+  </p:clrMapOvr>
+</p:sld>
+</file>
+
 <file path=ppt/theme/theme1.xml><?xml version="1.0" encoding="utf-8"?>
 <a:theme xmlns:a="http://schemas.openxmlformats.org/drawingml/2006/main" name="Office Theme">
   <a:themeElements>

</xml_diff>